<commit_message>
new head and tail
</commit_message>
<xml_diff>
--- a/schematics/Wiring.pptx
+++ b/schematics/Wiring.pptx
@@ -265,7 +265,7 @@
           <a:p>
             <a:fld id="{4031BD71-AB75-48A5-9DD3-2C8B92F7C741}" type="datetimeFigureOut">
               <a:rPr lang="de-DE" smtClean="0"/>
-              <a:t>14.05.2022</a:t>
+              <a:t>20.05.2022</a:t>
             </a:fld>
             <a:endParaRPr lang="de-DE"/>
           </a:p>
@@ -465,7 +465,7 @@
           <a:p>
             <a:fld id="{4031BD71-AB75-48A5-9DD3-2C8B92F7C741}" type="datetimeFigureOut">
               <a:rPr lang="de-DE" smtClean="0"/>
-              <a:t>14.05.2022</a:t>
+              <a:t>20.05.2022</a:t>
             </a:fld>
             <a:endParaRPr lang="de-DE"/>
           </a:p>
@@ -675,7 +675,7 @@
           <a:p>
             <a:fld id="{4031BD71-AB75-48A5-9DD3-2C8B92F7C741}" type="datetimeFigureOut">
               <a:rPr lang="de-DE" smtClean="0"/>
-              <a:t>14.05.2022</a:t>
+              <a:t>20.05.2022</a:t>
             </a:fld>
             <a:endParaRPr lang="de-DE"/>
           </a:p>
@@ -875,7 +875,7 @@
           <a:p>
             <a:fld id="{4031BD71-AB75-48A5-9DD3-2C8B92F7C741}" type="datetimeFigureOut">
               <a:rPr lang="de-DE" smtClean="0"/>
-              <a:t>14.05.2022</a:t>
+              <a:t>20.05.2022</a:t>
             </a:fld>
             <a:endParaRPr lang="de-DE"/>
           </a:p>
@@ -1151,7 +1151,7 @@
           <a:p>
             <a:fld id="{4031BD71-AB75-48A5-9DD3-2C8B92F7C741}" type="datetimeFigureOut">
               <a:rPr lang="de-DE" smtClean="0"/>
-              <a:t>14.05.2022</a:t>
+              <a:t>20.05.2022</a:t>
             </a:fld>
             <a:endParaRPr lang="de-DE"/>
           </a:p>
@@ -1419,7 +1419,7 @@
           <a:p>
             <a:fld id="{4031BD71-AB75-48A5-9DD3-2C8B92F7C741}" type="datetimeFigureOut">
               <a:rPr lang="de-DE" smtClean="0"/>
-              <a:t>14.05.2022</a:t>
+              <a:t>20.05.2022</a:t>
             </a:fld>
             <a:endParaRPr lang="de-DE"/>
           </a:p>
@@ -1834,7 +1834,7 @@
           <a:p>
             <a:fld id="{4031BD71-AB75-48A5-9DD3-2C8B92F7C741}" type="datetimeFigureOut">
               <a:rPr lang="de-DE" smtClean="0"/>
-              <a:t>14.05.2022</a:t>
+              <a:t>20.05.2022</a:t>
             </a:fld>
             <a:endParaRPr lang="de-DE"/>
           </a:p>
@@ -1976,7 +1976,7 @@
           <a:p>
             <a:fld id="{4031BD71-AB75-48A5-9DD3-2C8B92F7C741}" type="datetimeFigureOut">
               <a:rPr lang="de-DE" smtClean="0"/>
-              <a:t>14.05.2022</a:t>
+              <a:t>20.05.2022</a:t>
             </a:fld>
             <a:endParaRPr lang="de-DE"/>
           </a:p>
@@ -2089,7 +2089,7 @@
           <a:p>
             <a:fld id="{4031BD71-AB75-48A5-9DD3-2C8B92F7C741}" type="datetimeFigureOut">
               <a:rPr lang="de-DE" smtClean="0"/>
-              <a:t>14.05.2022</a:t>
+              <a:t>20.05.2022</a:t>
             </a:fld>
             <a:endParaRPr lang="de-DE"/>
           </a:p>
@@ -2402,7 +2402,7 @@
           <a:p>
             <a:fld id="{4031BD71-AB75-48A5-9DD3-2C8B92F7C741}" type="datetimeFigureOut">
               <a:rPr lang="de-DE" smtClean="0"/>
-              <a:t>14.05.2022</a:t>
+              <a:t>20.05.2022</a:t>
             </a:fld>
             <a:endParaRPr lang="de-DE"/>
           </a:p>
@@ -2691,7 +2691,7 @@
           <a:p>
             <a:fld id="{4031BD71-AB75-48A5-9DD3-2C8B92F7C741}" type="datetimeFigureOut">
               <a:rPr lang="de-DE" smtClean="0"/>
-              <a:t>14.05.2022</a:t>
+              <a:t>20.05.2022</a:t>
             </a:fld>
             <a:endParaRPr lang="de-DE"/>
           </a:p>
@@ -2934,7 +2934,7 @@
           <a:p>
             <a:fld id="{4031BD71-AB75-48A5-9DD3-2C8B92F7C741}" type="datetimeFigureOut">
               <a:rPr lang="de-DE" smtClean="0"/>
-              <a:t>14.05.2022</a:t>
+              <a:t>20.05.2022</a:t>
             </a:fld>
             <a:endParaRPr lang="de-DE"/>
           </a:p>
@@ -4900,16 +4900,15 @@
           </p:cNvPicPr>
           <p:nvPr/>
         </p:nvPicPr>
-        <p:blipFill>
+        <p:blipFill rotWithShape="1">
           <a:blip r:embed="rId2"/>
-          <a:stretch>
-            <a:fillRect/>
-          </a:stretch>
+          <a:srcRect l="16293" t="23938"/>
+          <a:stretch/>
         </p:blipFill>
         <p:spPr>
           <a:xfrm>
-            <a:off x="552450" y="694912"/>
-            <a:ext cx="7833747" cy="5845587"/>
+            <a:off x="444500" y="2043472"/>
+            <a:ext cx="6557397" cy="4446228"/>
           </a:xfrm>
           <a:prstGeom prst="rect">
             <a:avLst/>

</xml_diff>

<commit_message>
fixed socket of IMU layout
</commit_message>
<xml_diff>
--- a/schematics/Wiring.pptx
+++ b/schematics/Wiring.pptx
@@ -269,7 +269,7 @@
           <a:p>
             <a:fld id="{4031BD71-AB75-48A5-9DD3-2C8B92F7C741}" type="datetimeFigureOut">
               <a:rPr lang="de-DE" smtClean="0"/>
-              <a:t>28.06.2022</a:t>
+              <a:t>07.07.2022</a:t>
             </a:fld>
             <a:endParaRPr lang="de-DE"/>
           </a:p>
@@ -469,7 +469,7 @@
           <a:p>
             <a:fld id="{4031BD71-AB75-48A5-9DD3-2C8B92F7C741}" type="datetimeFigureOut">
               <a:rPr lang="de-DE" smtClean="0"/>
-              <a:t>28.06.2022</a:t>
+              <a:t>07.07.2022</a:t>
             </a:fld>
             <a:endParaRPr lang="de-DE"/>
           </a:p>
@@ -679,7 +679,7 @@
           <a:p>
             <a:fld id="{4031BD71-AB75-48A5-9DD3-2C8B92F7C741}" type="datetimeFigureOut">
               <a:rPr lang="de-DE" smtClean="0"/>
-              <a:t>28.06.2022</a:t>
+              <a:t>07.07.2022</a:t>
             </a:fld>
             <a:endParaRPr lang="de-DE"/>
           </a:p>
@@ -879,7 +879,7 @@
           <a:p>
             <a:fld id="{4031BD71-AB75-48A5-9DD3-2C8B92F7C741}" type="datetimeFigureOut">
               <a:rPr lang="de-DE" smtClean="0"/>
-              <a:t>28.06.2022</a:t>
+              <a:t>07.07.2022</a:t>
             </a:fld>
             <a:endParaRPr lang="de-DE"/>
           </a:p>
@@ -1155,7 +1155,7 @@
           <a:p>
             <a:fld id="{4031BD71-AB75-48A5-9DD3-2C8B92F7C741}" type="datetimeFigureOut">
               <a:rPr lang="de-DE" smtClean="0"/>
-              <a:t>28.06.2022</a:t>
+              <a:t>07.07.2022</a:t>
             </a:fld>
             <a:endParaRPr lang="de-DE"/>
           </a:p>
@@ -1423,7 +1423,7 @@
           <a:p>
             <a:fld id="{4031BD71-AB75-48A5-9DD3-2C8B92F7C741}" type="datetimeFigureOut">
               <a:rPr lang="de-DE" smtClean="0"/>
-              <a:t>28.06.2022</a:t>
+              <a:t>07.07.2022</a:t>
             </a:fld>
             <a:endParaRPr lang="de-DE"/>
           </a:p>
@@ -1838,7 +1838,7 @@
           <a:p>
             <a:fld id="{4031BD71-AB75-48A5-9DD3-2C8B92F7C741}" type="datetimeFigureOut">
               <a:rPr lang="de-DE" smtClean="0"/>
-              <a:t>28.06.2022</a:t>
+              <a:t>07.07.2022</a:t>
             </a:fld>
             <a:endParaRPr lang="de-DE"/>
           </a:p>
@@ -1980,7 +1980,7 @@
           <a:p>
             <a:fld id="{4031BD71-AB75-48A5-9DD3-2C8B92F7C741}" type="datetimeFigureOut">
               <a:rPr lang="de-DE" smtClean="0"/>
-              <a:t>28.06.2022</a:t>
+              <a:t>07.07.2022</a:t>
             </a:fld>
             <a:endParaRPr lang="de-DE"/>
           </a:p>
@@ -2093,7 +2093,7 @@
           <a:p>
             <a:fld id="{4031BD71-AB75-48A5-9DD3-2C8B92F7C741}" type="datetimeFigureOut">
               <a:rPr lang="de-DE" smtClean="0"/>
-              <a:t>28.06.2022</a:t>
+              <a:t>07.07.2022</a:t>
             </a:fld>
             <a:endParaRPr lang="de-DE"/>
           </a:p>
@@ -2406,7 +2406,7 @@
           <a:p>
             <a:fld id="{4031BD71-AB75-48A5-9DD3-2C8B92F7C741}" type="datetimeFigureOut">
               <a:rPr lang="de-DE" smtClean="0"/>
-              <a:t>28.06.2022</a:t>
+              <a:t>07.07.2022</a:t>
             </a:fld>
             <a:endParaRPr lang="de-DE"/>
           </a:p>
@@ -2695,7 +2695,7 @@
           <a:p>
             <a:fld id="{4031BD71-AB75-48A5-9DD3-2C8B92F7C741}" type="datetimeFigureOut">
               <a:rPr lang="de-DE" smtClean="0"/>
-              <a:t>28.06.2022</a:t>
+              <a:t>07.07.2022</a:t>
             </a:fld>
             <a:endParaRPr lang="de-DE"/>
           </a:p>
@@ -2938,7 +2938,7 @@
           <a:p>
             <a:fld id="{4031BD71-AB75-48A5-9DD3-2C8B92F7C741}" type="datetimeFigureOut">
               <a:rPr lang="de-DE" smtClean="0"/>
-              <a:t>28.06.2022</a:t>
+              <a:t>07.07.2022</a:t>
             </a:fld>
             <a:endParaRPr lang="de-DE"/>
           </a:p>
@@ -6924,7 +6924,7 @@
         <p:spPr>
           <a:xfrm>
             <a:off x="4150173" y="3492812"/>
-            <a:ext cx="1803176" cy="1384995"/>
+            <a:ext cx="3044954" cy="1200329"/>
           </a:xfrm>
           <a:prstGeom prst="rect">
             <a:avLst/>
@@ -6944,7 +6944,7 @@
             </a:pPr>
             <a:r>
               <a:rPr lang="de-DE" sz="1200" b="1" dirty="0"/>
-              <a:t>IMU 	PIN	Function</a:t>
+              <a:t>IMU 	PIN	Function	Teensy</a:t>
             </a:r>
           </a:p>
           <a:p>
@@ -6955,7 +6955,7 @@
             </a:pPr>
             <a:r>
               <a:rPr lang="de-DE" sz="1200" dirty="0"/>
-              <a:t>10	5	Disable</a:t>
+              <a:t>10	5	Disable	32</a:t>
             </a:r>
           </a:p>
           <a:p>
@@ -6966,7 +6966,7 @@
             </a:pPr>
             <a:r>
               <a:rPr lang="de-DE" sz="1200" dirty="0"/>
-              <a:t>8	4	GND</a:t>
+              <a:t>8	4	GND	GND</a:t>
             </a:r>
           </a:p>
           <a:p>
@@ -6977,7 +6977,7 @@
             </a:pPr>
             <a:r>
               <a:rPr lang="de-DE" sz="1200" dirty="0"/>
-              <a:t>5	3	TxD</a:t>
+              <a:t>5	3	TxD	RX7</a:t>
             </a:r>
           </a:p>
           <a:p>
@@ -6988,7 +6988,7 @@
             </a:pPr>
             <a:r>
               <a:rPr lang="de-DE" sz="1200" dirty="0"/>
-              <a:t>4	2	RxD</a:t>
+              <a:t>4	2	RxD	TX7</a:t>
             </a:r>
           </a:p>
           <a:p>
@@ -6999,15 +6999,12 @@
             </a:pPr>
             <a:r>
               <a:rPr lang="de-DE" sz="1200" dirty="0"/>
-              <a:t>3	1	Vin</a:t>
-            </a:r>
-          </a:p>
-          <a:p>
-            <a:pPr>
-              <a:tabLst>
-                <a:tab pos="447675" algn="l"/>
-              </a:tabLst>
-            </a:pPr>
+              <a:t>3	1</a:t>
+            </a:r>
+            <a:r>
+              <a:rPr lang="de-DE" sz="1200"/>
+              <a:t>	Vin	3.3V</a:t>
+            </a:r>
             <a:endParaRPr lang="de-DE" sz="1200" dirty="0"/>
           </a:p>
         </p:txBody>

</xml_diff>

<commit_message>
buffersize in UART7 for less checksum errors
</commit_message>
<xml_diff>
--- a/schematics/Wiring.pptx
+++ b/schematics/Wiring.pptx
@@ -272,7 +272,7 @@
           <a:p>
             <a:fld id="{4031BD71-AB75-48A5-9DD3-2C8B92F7C741}" type="datetimeFigureOut">
               <a:rPr lang="de-DE" smtClean="0"/>
-              <a:t>18.07.2022</a:t>
+              <a:t>19.07.2022</a:t>
             </a:fld>
             <a:endParaRPr lang="de-DE"/>
           </a:p>
@@ -472,7 +472,7 @@
           <a:p>
             <a:fld id="{4031BD71-AB75-48A5-9DD3-2C8B92F7C741}" type="datetimeFigureOut">
               <a:rPr lang="de-DE" smtClean="0"/>
-              <a:t>18.07.2022</a:t>
+              <a:t>19.07.2022</a:t>
             </a:fld>
             <a:endParaRPr lang="de-DE"/>
           </a:p>
@@ -682,7 +682,7 @@
           <a:p>
             <a:fld id="{4031BD71-AB75-48A5-9DD3-2C8B92F7C741}" type="datetimeFigureOut">
               <a:rPr lang="de-DE" smtClean="0"/>
-              <a:t>18.07.2022</a:t>
+              <a:t>19.07.2022</a:t>
             </a:fld>
             <a:endParaRPr lang="de-DE"/>
           </a:p>
@@ -882,7 +882,7 @@
           <a:p>
             <a:fld id="{4031BD71-AB75-48A5-9DD3-2C8B92F7C741}" type="datetimeFigureOut">
               <a:rPr lang="de-DE" smtClean="0"/>
-              <a:t>18.07.2022</a:t>
+              <a:t>19.07.2022</a:t>
             </a:fld>
             <a:endParaRPr lang="de-DE"/>
           </a:p>
@@ -1158,7 +1158,7 @@
           <a:p>
             <a:fld id="{4031BD71-AB75-48A5-9DD3-2C8B92F7C741}" type="datetimeFigureOut">
               <a:rPr lang="de-DE" smtClean="0"/>
-              <a:t>18.07.2022</a:t>
+              <a:t>19.07.2022</a:t>
             </a:fld>
             <a:endParaRPr lang="de-DE"/>
           </a:p>
@@ -1426,7 +1426,7 @@
           <a:p>
             <a:fld id="{4031BD71-AB75-48A5-9DD3-2C8B92F7C741}" type="datetimeFigureOut">
               <a:rPr lang="de-DE" smtClean="0"/>
-              <a:t>18.07.2022</a:t>
+              <a:t>19.07.2022</a:t>
             </a:fld>
             <a:endParaRPr lang="de-DE"/>
           </a:p>
@@ -1841,7 +1841,7 @@
           <a:p>
             <a:fld id="{4031BD71-AB75-48A5-9DD3-2C8B92F7C741}" type="datetimeFigureOut">
               <a:rPr lang="de-DE" smtClean="0"/>
-              <a:t>18.07.2022</a:t>
+              <a:t>19.07.2022</a:t>
             </a:fld>
             <a:endParaRPr lang="de-DE"/>
           </a:p>
@@ -1983,7 +1983,7 @@
           <a:p>
             <a:fld id="{4031BD71-AB75-48A5-9DD3-2C8B92F7C741}" type="datetimeFigureOut">
               <a:rPr lang="de-DE" smtClean="0"/>
-              <a:t>18.07.2022</a:t>
+              <a:t>19.07.2022</a:t>
             </a:fld>
             <a:endParaRPr lang="de-DE"/>
           </a:p>
@@ -2096,7 +2096,7 @@
           <a:p>
             <a:fld id="{4031BD71-AB75-48A5-9DD3-2C8B92F7C741}" type="datetimeFigureOut">
               <a:rPr lang="de-DE" smtClean="0"/>
-              <a:t>18.07.2022</a:t>
+              <a:t>19.07.2022</a:t>
             </a:fld>
             <a:endParaRPr lang="de-DE"/>
           </a:p>
@@ -2409,7 +2409,7 @@
           <a:p>
             <a:fld id="{4031BD71-AB75-48A5-9DD3-2C8B92F7C741}" type="datetimeFigureOut">
               <a:rPr lang="de-DE" smtClean="0"/>
-              <a:t>18.07.2022</a:t>
+              <a:t>19.07.2022</a:t>
             </a:fld>
             <a:endParaRPr lang="de-DE"/>
           </a:p>
@@ -2698,7 +2698,7 @@
           <a:p>
             <a:fld id="{4031BD71-AB75-48A5-9DD3-2C8B92F7C741}" type="datetimeFigureOut">
               <a:rPr lang="de-DE" smtClean="0"/>
-              <a:t>18.07.2022</a:t>
+              <a:t>19.07.2022</a:t>
             </a:fld>
             <a:endParaRPr lang="de-DE"/>
           </a:p>
@@ -2941,7 +2941,7 @@
           <a:p>
             <a:fld id="{4031BD71-AB75-48A5-9DD3-2C8B92F7C741}" type="datetimeFigureOut">
               <a:rPr lang="de-DE" smtClean="0"/>
-              <a:t>18.07.2022</a:t>
+              <a:t>19.07.2022</a:t>
             </a:fld>
             <a:endParaRPr lang="de-DE"/>
           </a:p>
@@ -7480,36 +7480,6 @@
           </a:prstGeom>
         </p:spPr>
       </p:pic>
-      <p:pic>
-        <p:nvPicPr>
-          <p:cNvPr id="14" name="Picture 13">
-            <a:extLst>
-              <a:ext uri="{FF2B5EF4-FFF2-40B4-BE49-F238E27FC236}">
-                <a16:creationId xmlns:a16="http://schemas.microsoft.com/office/drawing/2014/main" id="{D846BB70-CA0A-EAC0-F2B9-42FC0D3F962E}"/>
-              </a:ext>
-            </a:extLst>
-          </p:cNvPr>
-          <p:cNvPicPr>
-            <a:picLocks noChangeAspect="1"/>
-          </p:cNvPicPr>
-          <p:nvPr/>
-        </p:nvPicPr>
-        <p:blipFill>
-          <a:blip r:embed="rId3"/>
-          <a:stretch>
-            <a:fillRect/>
-          </a:stretch>
-        </p:blipFill>
-        <p:spPr>
-          <a:xfrm>
-            <a:off x="6645565" y="688856"/>
-            <a:ext cx="5669280" cy="5625400"/>
-          </a:xfrm>
-          <a:prstGeom prst="rect">
-            <a:avLst/>
-          </a:prstGeom>
-        </p:spPr>
-      </p:pic>
       <p:sp>
         <p:nvSpPr>
           <p:cNvPr id="15" name="Rectangle 14">

</xml_diff>